<commit_message>
Deploy hytechcamps/twine to github.com/hytechcamps/twine.git:gh-pages
</commit_message>
<xml_diff>
--- a/InteractiveStorytelling.pptx
+++ b/InteractiveStorytelling.pptx
@@ -226,7 +226,7 @@
           <a:p>
             <a:fld id="{19104133-B5B0-4351-8158-4F0E5EB1E2BF}" type="datetimeFigureOut">
               <a:rPr lang="en-US" smtClean="0"/>
-              <a:t>4/13/2020</a:t>
+              <a:t>6/11/2020</a:t>
             </a:fld>
             <a:endParaRPr lang="en-US"/>
           </a:p>
@@ -1968,19 +1968,15 @@
           <a:p>
             <a:r>
               <a:rPr lang="en-US" dirty="0" smtClean="0"/>
-              <a:t>Once</a:t>
+              <a:t>These books are the physical</a:t>
             </a:r>
             <a:r>
               <a:rPr lang="en-US" baseline="0" dirty="0" smtClean="0"/>
-              <a:t> computers became more popular, these books inspired </a:t>
-            </a:r>
-            <a:r>
-              <a:rPr lang="en-US" i="1" baseline="0" dirty="0" smtClean="0"/>
-              <a:t>interactive fiction</a:t>
-            </a:r>
-            <a:r>
-              <a:rPr lang="en-US" i="0" baseline="0" dirty="0" smtClean="0"/>
-              <a:t>.</a:t>
+              <a:t> version </a:t>
+            </a:r>
+            <a:r>
+              <a:rPr lang="en-US" baseline="0" smtClean="0"/>
+              <a:t>of interactive fiction.</a:t>
             </a:r>
             <a:endParaRPr lang="en-US" dirty="0"/>
           </a:p>
@@ -3109,7 +3105,7 @@
             <a:fld id="{1C2D31DE-C454-491C-B5C3-F097855E3DF7}" type="datetime4">
               <a:rPr lang="en-US" smtClean="0"/>
               <a:pPr/>
-              <a:t>April 13, 2020</a:t>
+              <a:t>June 11, 2020</a:t>
             </a:fld>
             <a:endParaRPr lang="en-US" dirty="0"/>
           </a:p>
@@ -6509,7 +6505,7 @@
           <a:p>
             <a:fld id="{5958763E-B898-436D-883D-03711491D54A}" type="datetimeFigureOut">
               <a:rPr lang="en-US" smtClean="0"/>
-              <a:t>4/13/2020</a:t>
+              <a:t>6/11/2020</a:t>
             </a:fld>
             <a:endParaRPr lang="en-US"/>
           </a:p>
@@ -6710,7 +6706,7 @@
           <a:p>
             <a:fld id="{5958763E-B898-436D-883D-03711491D54A}" type="datetimeFigureOut">
               <a:rPr lang="en-US" smtClean="0"/>
-              <a:t>4/13/2020</a:t>
+              <a:t>6/11/2020</a:t>
             </a:fld>
             <a:endParaRPr lang="en-US"/>
           </a:p>
@@ -6967,7 +6963,7 @@
           <a:p>
             <a:fld id="{5958763E-B898-436D-883D-03711491D54A}" type="datetimeFigureOut">
               <a:rPr lang="en-US" smtClean="0"/>
-              <a:t>4/13/2020</a:t>
+              <a:t>6/11/2020</a:t>
             </a:fld>
             <a:endParaRPr lang="en-US"/>
           </a:p>
@@ -7322,7 +7318,7 @@
           <a:p>
             <a:fld id="{5958763E-B898-436D-883D-03711491D54A}" type="datetimeFigureOut">
               <a:rPr lang="en-US" smtClean="0"/>
-              <a:t>4/13/2020</a:t>
+              <a:t>6/11/2020</a:t>
             </a:fld>
             <a:endParaRPr lang="en-US"/>
           </a:p>
@@ -7745,7 +7741,7 @@
           <a:p>
             <a:fld id="{5958763E-B898-436D-883D-03711491D54A}" type="datetimeFigureOut">
               <a:rPr lang="en-US" smtClean="0"/>
-              <a:t>4/13/2020</a:t>
+              <a:t>6/11/2020</a:t>
             </a:fld>
             <a:endParaRPr lang="en-US"/>
           </a:p>
@@ -8253,7 +8249,7 @@
           <a:p>
             <a:fld id="{5958763E-B898-436D-883D-03711491D54A}" type="datetimeFigureOut">
               <a:rPr lang="en-US" smtClean="0"/>
-              <a:t>4/13/2020</a:t>
+              <a:t>6/11/2020</a:t>
             </a:fld>
             <a:endParaRPr lang="en-US"/>
           </a:p>
@@ -8711,7 +8707,7 @@
           <a:p>
             <a:fld id="{5958763E-B898-436D-883D-03711491D54A}" type="datetimeFigureOut">
               <a:rPr lang="en-US" smtClean="0"/>
-              <a:t>4/13/2020</a:t>
+              <a:t>6/11/2020</a:t>
             </a:fld>
             <a:endParaRPr lang="en-US"/>
           </a:p>
@@ -9329,7 +9325,7 @@
           <a:p>
             <a:fld id="{5958763E-B898-436D-883D-03711491D54A}" type="datetimeFigureOut">
               <a:rPr lang="en-US" smtClean="0"/>
-              <a:t>4/13/2020</a:t>
+              <a:t>6/11/2020</a:t>
             </a:fld>
             <a:endParaRPr lang="en-US"/>
           </a:p>
@@ -10107,7 +10103,7 @@
           <a:p>
             <a:fld id="{5958763E-B898-436D-883D-03711491D54A}" type="datetimeFigureOut">
               <a:rPr lang="en-US" smtClean="0"/>
-              <a:t>4/13/2020</a:t>
+              <a:t>6/11/2020</a:t>
             </a:fld>
             <a:endParaRPr lang="en-US"/>
           </a:p>
@@ -10218,7 +10214,7 @@
           <a:p>
             <a:fld id="{5958763E-B898-436D-883D-03711491D54A}" type="datetimeFigureOut">
               <a:rPr lang="en-US" smtClean="0"/>
-              <a:t>4/13/2020</a:t>
+              <a:t>6/11/2020</a:t>
             </a:fld>
             <a:endParaRPr lang="en-US"/>
           </a:p>
@@ -10560,7 +10556,7 @@
             <a:fld id="{1C2D31DE-C454-491C-B5C3-F097855E3DF7}" type="datetime4">
               <a:rPr lang="en-US" smtClean="0"/>
               <a:pPr/>
-              <a:t>April 13, 2020</a:t>
+              <a:t>June 11, 2020</a:t>
             </a:fld>
             <a:endParaRPr lang="en-US" dirty="0"/>
           </a:p>
@@ -13720,7 +13716,7 @@
           <a:p>
             <a:fld id="{5958763E-B898-436D-883D-03711491D54A}" type="datetimeFigureOut">
               <a:rPr lang="en-US" smtClean="0"/>
-              <a:t>4/13/2020</a:t>
+              <a:t>6/11/2020</a:t>
             </a:fld>
             <a:endParaRPr lang="en-US"/>
           </a:p>
@@ -13851,7 +13847,7 @@
           <a:p>
             <a:fld id="{5958763E-B898-436D-883D-03711491D54A}" type="datetimeFigureOut">
               <a:rPr lang="en-US" smtClean="0"/>
-              <a:t>4/13/2020</a:t>
+              <a:t>6/11/2020</a:t>
             </a:fld>
             <a:endParaRPr lang="en-US"/>
           </a:p>
@@ -13982,7 +13978,7 @@
           <a:p>
             <a:fld id="{5958763E-B898-436D-883D-03711491D54A}" type="datetimeFigureOut">
               <a:rPr lang="en-US" smtClean="0"/>
-              <a:t>4/13/2020</a:t>
+              <a:t>6/11/2020</a:t>
             </a:fld>
             <a:endParaRPr lang="en-US"/>
           </a:p>
@@ -14113,7 +14109,7 @@
           <a:p>
             <a:fld id="{5958763E-B898-436D-883D-03711491D54A}" type="datetimeFigureOut">
               <a:rPr lang="en-US" smtClean="0"/>
-              <a:t>4/13/2020</a:t>
+              <a:t>6/11/2020</a:t>
             </a:fld>
             <a:endParaRPr lang="en-US"/>
           </a:p>
@@ -14244,7 +14240,7 @@
           <a:p>
             <a:fld id="{5958763E-B898-436D-883D-03711491D54A}" type="datetimeFigureOut">
               <a:rPr lang="en-US" smtClean="0"/>
-              <a:t>4/13/2020</a:t>
+              <a:t>6/11/2020</a:t>
             </a:fld>
             <a:endParaRPr lang="en-US"/>
           </a:p>
@@ -14375,7 +14371,7 @@
           <a:p>
             <a:fld id="{5958763E-B898-436D-883D-03711491D54A}" type="datetimeFigureOut">
               <a:rPr lang="en-US" smtClean="0"/>
-              <a:t>4/13/2020</a:t>
+              <a:t>6/11/2020</a:t>
             </a:fld>
             <a:endParaRPr lang="en-US"/>
           </a:p>
@@ -14506,7 +14502,7 @@
           <a:p>
             <a:fld id="{5958763E-B898-436D-883D-03711491D54A}" type="datetimeFigureOut">
               <a:rPr lang="en-US" smtClean="0"/>
-              <a:t>4/13/2020</a:t>
+              <a:t>6/11/2020</a:t>
             </a:fld>
             <a:endParaRPr lang="en-US"/>
           </a:p>
@@ -14637,7 +14633,7 @@
           <a:p>
             <a:fld id="{5958763E-B898-436D-883D-03711491D54A}" type="datetimeFigureOut">
               <a:rPr lang="en-US" smtClean="0"/>
-              <a:t>4/13/2020</a:t>
+              <a:t>6/11/2020</a:t>
             </a:fld>
             <a:endParaRPr lang="en-US"/>
           </a:p>
@@ -14777,7 +14773,7 @@
           <a:p>
             <a:fld id="{5958763E-B898-436D-883D-03711491D54A}" type="datetimeFigureOut">
               <a:rPr lang="en-US" smtClean="0"/>
-              <a:t>4/13/2020</a:t>
+              <a:t>6/11/2020</a:t>
             </a:fld>
             <a:endParaRPr lang="en-US"/>
           </a:p>
@@ -18138,7 +18134,7 @@
             <a:fld id="{1C2D31DE-C454-491C-B5C3-F097855E3DF7}" type="datetime4">
               <a:rPr lang="en-US" smtClean="0"/>
               <a:pPr/>
-              <a:t>April 13, 2020</a:t>
+              <a:t>June 11, 2020</a:t>
             </a:fld>
             <a:endParaRPr lang="en-US" dirty="0"/>
           </a:p>
@@ -30383,7 +30379,7 @@
           <a:p>
             <a:fld id="{5958763E-B898-436D-883D-03711491D54A}" type="datetimeFigureOut">
               <a:rPr lang="en-US" smtClean="0"/>
-              <a:t>4/13/2020</a:t>
+              <a:t>6/11/2020</a:t>
             </a:fld>
             <a:endParaRPr lang="en-US"/>
           </a:p>
@@ -30792,7 +30788,7 @@
           <a:p>
             <a:fld id="{5958763E-B898-436D-883D-03711491D54A}" type="datetimeFigureOut">
               <a:rPr lang="en-US" smtClean="0"/>
-              <a:t>4/13/2020</a:t>
+              <a:t>6/11/2020</a:t>
             </a:fld>
             <a:endParaRPr lang="en-US"/>
           </a:p>
@@ -31093,7 +31089,7 @@
           <a:p>
             <a:fld id="{5958763E-B898-436D-883D-03711491D54A}" type="datetimeFigureOut">
               <a:rPr lang="en-US" smtClean="0"/>
-              <a:t>4/13/2020</a:t>
+              <a:t>6/11/2020</a:t>
             </a:fld>
             <a:endParaRPr lang="en-US"/>
           </a:p>
@@ -31301,7 +31297,7 @@
           <a:p>
             <a:fld id="{5958763E-B898-436D-883D-03711491D54A}" type="datetimeFigureOut">
               <a:rPr lang="en-US" smtClean="0"/>
-              <a:t>4/13/2020</a:t>
+              <a:t>6/11/2020</a:t>
             </a:fld>
             <a:endParaRPr lang="en-US"/>
           </a:p>
@@ -31569,7 +31565,7 @@
           <a:p>
             <a:fld id="{5958763E-B898-436D-883D-03711491D54A}" type="datetimeFigureOut">
               <a:rPr lang="en-US" smtClean="0"/>
-              <a:t>4/13/2020</a:t>
+              <a:t>6/11/2020</a:t>
             </a:fld>
             <a:endParaRPr lang="en-US"/>
           </a:p>
@@ -32086,7 +32082,7 @@
           <a:p>
             <a:fld id="{5958763E-B898-436D-883D-03711491D54A}" type="datetimeFigureOut">
               <a:rPr lang="en-US" smtClean="0"/>
-              <a:t>4/13/2020</a:t>
+              <a:t>6/11/2020</a:t>
             </a:fld>
             <a:endParaRPr lang="en-US"/>
           </a:p>
@@ -32574,7 +32570,7 @@
           <a:p>
             <a:fld id="{5958763E-B898-436D-883D-03711491D54A}" type="datetimeFigureOut">
               <a:rPr lang="en-US" smtClean="0"/>
-              <a:t>4/13/2020</a:t>
+              <a:t>6/11/2020</a:t>
             </a:fld>
             <a:endParaRPr lang="en-US"/>
           </a:p>
@@ -33400,7 +33396,7 @@
           <a:p>
             <a:fld id="{5958763E-B898-436D-883D-03711491D54A}" type="datetimeFigureOut">
               <a:rPr lang="en-US" smtClean="0"/>
-              <a:t>4/13/2020</a:t>
+              <a:t>6/11/2020</a:t>
             </a:fld>
             <a:endParaRPr lang="en-US"/>
           </a:p>
@@ -33608,7 +33604,7 @@
           <a:p>
             <a:fld id="{5958763E-B898-436D-883D-03711491D54A}" type="datetimeFigureOut">
               <a:rPr lang="en-US" smtClean="0"/>
-              <a:t>4/13/2020</a:t>
+              <a:t>6/11/2020</a:t>
             </a:fld>
             <a:endParaRPr lang="en-US"/>
           </a:p>
@@ -33950,7 +33946,7 @@
           <a:p>
             <a:fld id="{5958763E-B898-436D-883D-03711491D54A}" type="datetimeFigureOut">
               <a:rPr lang="en-US" smtClean="0"/>
-              <a:t>4/13/2020</a:t>
+              <a:t>6/11/2020</a:t>
             </a:fld>
             <a:endParaRPr lang="en-US"/>
           </a:p>
@@ -34187,7 +34183,7 @@
           <a:p>
             <a:fld id="{5958763E-B898-436D-883D-03711491D54A}" type="datetimeFigureOut">
               <a:rPr lang="en-US" smtClean="0"/>
-              <a:t>4/13/2020</a:t>
+              <a:t>6/11/2020</a:t>
             </a:fld>
             <a:endParaRPr lang="en-US"/>
           </a:p>
@@ -34438,7 +34434,7 @@
           <a:p>
             <a:fld id="{5958763E-B898-436D-883D-03711491D54A}" type="datetimeFigureOut">
               <a:rPr lang="en-US" smtClean="0"/>
-              <a:t>4/13/2020</a:t>
+              <a:t>6/11/2020</a:t>
             </a:fld>
             <a:endParaRPr lang="en-US"/>
           </a:p>
@@ -40192,13 +40188,6 @@
               </a:rPr>
               <a:t>Practice!</a:t>
             </a:r>
-            <a:endParaRPr lang="en-US" sz="2400" dirty="0" smtClean="0">
-              <a:solidFill>
-                <a:schemeClr val="accent2">
-                  <a:lumMod val="50000"/>
-                </a:schemeClr>
-              </a:solidFill>
-            </a:endParaRPr>
           </a:p>
         </p:txBody>
       </p:sp>
@@ -40388,15 +40377,6 @@
               </a:rPr>
               <a:t>5</a:t>
             </a:r>
-            <a:endParaRPr lang="en-US" sz="9600" b="1" dirty="0" smtClean="0">
-              <a:solidFill>
-                <a:schemeClr val="accent2">
-                  <a:lumMod val="50000"/>
-                </a:schemeClr>
-              </a:solidFill>
-              <a:ea typeface="Segoe UI" pitchFamily="34" charset="0"/>
-              <a:cs typeface="Segoe UI" pitchFamily="34" charset="0"/>
-            </a:endParaRPr>
           </a:p>
         </p:txBody>
       </p:sp>
@@ -41168,16 +41148,6 @@
               </a:rPr>
               <a:t>&gt;&gt;</a:t>
             </a:r>
-            <a:endParaRPr lang="en-US" sz="2800" b="1" dirty="0" smtClean="0">
-              <a:solidFill>
-                <a:schemeClr val="accent2">
-                  <a:lumMod val="50000"/>
-                </a:schemeClr>
-              </a:solidFill>
-              <a:latin typeface="Consolas" panose="020B0609020204030204" pitchFamily="49" charset="0"/>
-              <a:ea typeface="Segoe UI" pitchFamily="34" charset="0"/>
-              <a:cs typeface="Segoe UI" pitchFamily="34" charset="0"/>
-            </a:endParaRPr>
           </a:p>
         </p:txBody>
       </p:sp>
@@ -41892,7 +41862,7 @@
         </p:spPr>
         <p:txBody>
           <a:bodyPr>
-            <a:normAutofit/>
+            <a:normAutofit lnSpcReduction="10000"/>
           </a:bodyPr>
           <a:lstStyle/>
           <a:p>
@@ -41934,17 +41904,18 @@
           </a:p>
           <a:p>
             <a:r>
-              <a:rPr lang="en-US" dirty="0" smtClean="0"/>
-              <a:t>These books inspired </a:t>
+              <a:rPr lang="en-US" dirty="0"/>
+              <a:t>These books are the physical version of </a:t>
+            </a:r>
+            <a:r>
+              <a:rPr lang="en-US" i="1" dirty="0"/>
+              <a:t>interactive </a:t>
             </a:r>
             <a:r>
               <a:rPr lang="en-US" i="1" dirty="0" smtClean="0"/>
-              <a:t>interactive fiction</a:t>
+              <a:t>fiction</a:t>
             </a:r>
             <a:endParaRPr lang="en-US" dirty="0"/>
-          </a:p>
-          <a:p>
-            <a:endParaRPr lang="en-US" dirty="0" smtClean="0"/>
           </a:p>
         </p:txBody>
       </p:sp>
@@ -42177,67 +42148,6 @@
                                           <p:spTgt spid="3">
                                             <p:txEl>
                                               <p:pRg st="5" end="5"/>
-                                            </p:txEl>
-                                          </p:spTgt>
-                                        </p:tgtEl>
-                                      </p:cBhvr>
-                                    </p:animEffect>
-                                  </p:childTnLst>
-                                </p:cTn>
-                              </p:par>
-                            </p:childTnLst>
-                          </p:cTn>
-                        </p:par>
-                      </p:childTnLst>
-                    </p:cTn>
-                  </p:par>
-                  <p:par>
-                    <p:cTn id="18" fill="hold">
-                      <p:stCondLst>
-                        <p:cond delay="indefinite"/>
-                      </p:stCondLst>
-                      <p:childTnLst>
-                        <p:par>
-                          <p:cTn id="19" fill="hold">
-                            <p:stCondLst>
-                              <p:cond delay="0"/>
-                            </p:stCondLst>
-                            <p:childTnLst>
-                              <p:par>
-                                <p:cTn id="20" presetID="10" presetClass="entr" presetSubtype="0" fill="hold" grpId="0" nodeType="clickEffect">
-                                  <p:stCondLst>
-                                    <p:cond delay="0"/>
-                                  </p:stCondLst>
-                                  <p:childTnLst>
-                                    <p:set>
-                                      <p:cBhvr>
-                                        <p:cTn id="21" dur="1" fill="hold">
-                                          <p:stCondLst>
-                                            <p:cond delay="0"/>
-                                          </p:stCondLst>
-                                        </p:cTn>
-                                        <p:tgtEl>
-                                          <p:spTgt spid="3">
-                                            <p:txEl>
-                                              <p:pRg st="7" end="7"/>
-                                            </p:txEl>
-                                          </p:spTgt>
-                                        </p:tgtEl>
-                                        <p:attrNameLst>
-                                          <p:attrName>style.visibility</p:attrName>
-                                        </p:attrNameLst>
-                                      </p:cBhvr>
-                                      <p:to>
-                                        <p:strVal val="visible"/>
-                                      </p:to>
-                                    </p:set>
-                                    <p:animEffect transition="in" filter="fade">
-                                      <p:cBhvr>
-                                        <p:cTn id="22" dur="500"/>
-                                        <p:tgtEl>
-                                          <p:spTgt spid="3">
-                                            <p:txEl>
-                                              <p:pRg st="7" end="7"/>
                                             </p:txEl>
                                           </p:spTgt>
                                         </p:tgtEl>

</xml_diff>